<commit_message>
added 3d print instruct
</commit_message>
<xml_diff>
--- a/powerpoints/Arduino-uge-2.pptx
+++ b/powerpoints/Arduino-uge-2.pptx
@@ -319,6 +319,11 @@
       </a:defRPr>
     </a:lvl9pPr>
   </p:defaultTextStyle>
+  <p:extLst>
+    <p:ext uri="{EFAFB233-063F-42B5-8137-9DF3F51BA10A}">
+      <p15:sldGuideLst xmlns:p15="http://schemas.microsoft.com/office/powerpoint/2012/main"/>
+    </p:ext>
+  </p:extLst>
 </p:presentation>
 </file>
 
@@ -3000,7 +3005,7 @@
           </a:ln>
           <a:extLst>
             <a:ext uri="{C572A759-6A51-4108-AA02-DFA0A04FC94B}">
-              <ma14:wrappingTextBoxFlag xmlns:ma14="http://schemas.microsoft.com/office/mac/drawingml/2011/main" xmlns="" val="1"/>
+              <ma14:wrappingTextBoxFlag xmlns="" xmlns:ma14="http://schemas.microsoft.com/office/mac/drawingml/2011/main" val="1"/>
             </a:ext>
           </a:extLst>
         </p:spPr>
@@ -3039,7 +3044,7 @@
           </a:ln>
           <a:extLst>
             <a:ext uri="{C572A759-6A51-4108-AA02-DFA0A04FC94B}">
-              <ma14:wrappingTextBoxFlag xmlns:ma14="http://schemas.microsoft.com/office/mac/drawingml/2011/main" xmlns="" val="1"/>
+              <ma14:wrappingTextBoxFlag xmlns="" xmlns:ma14="http://schemas.microsoft.com/office/mac/drawingml/2011/main" val="1"/>
             </a:ext>
           </a:extLst>
         </p:spPr>
@@ -4099,7 +4104,7 @@
           </a:ln>
           <a:extLst>
             <a:ext uri="{C572A759-6A51-4108-AA02-DFA0A04FC94B}">
-              <ma14:wrappingTextBoxFlag xmlns:ma14="http://schemas.microsoft.com/office/mac/drawingml/2011/main" xmlns="" val="1"/>
+              <ma14:wrappingTextBoxFlag xmlns="" xmlns:ma14="http://schemas.microsoft.com/office/mac/drawingml/2011/main" val="1"/>
             </a:ext>
           </a:extLst>
         </p:spPr>

</xml_diff>